<commit_message>
Added Dr. DotNet background
</commit_message>
<xml_diff>
--- a/media/bumpers/Bumpers.pptx
+++ b/media/bumpers/Bumpers.pptx
@@ -8,6 +8,7 @@
     <p:sldId id="256" r:id="rId2"/>
     <p:sldId id="257" r:id="rId3"/>
     <p:sldId id="258" r:id="rId4"/>
+    <p:sldId id="260" r:id="rId5"/>
   </p:sldIdLst>
   <p:sldSz cx="12192000" cy="6858000"/>
   <p:notesSz cx="6858000" cy="9144000"/>
@@ -261,7 +262,7 @@
           <a:p>
             <a:fld id="{5B9A50E9-7867-4611-83A7-BE32F136494E}" type="datetimeFigureOut">
               <a:rPr lang="en-US" smtClean="0"/>
-              <a:t>7/1/2020</a:t>
+              <a:t>7/10/2020</a:t>
             </a:fld>
             <a:endParaRPr lang="en-US"/>
           </a:p>
@@ -459,7 +460,7 @@
           <a:p>
             <a:fld id="{5B9A50E9-7867-4611-83A7-BE32F136494E}" type="datetimeFigureOut">
               <a:rPr lang="en-US" smtClean="0"/>
-              <a:t>7/1/2020</a:t>
+              <a:t>7/10/2020</a:t>
             </a:fld>
             <a:endParaRPr lang="en-US"/>
           </a:p>
@@ -667,7 +668,7 @@
           <a:p>
             <a:fld id="{5B9A50E9-7867-4611-83A7-BE32F136494E}" type="datetimeFigureOut">
               <a:rPr lang="en-US" smtClean="0"/>
-              <a:t>7/1/2020</a:t>
+              <a:t>7/10/2020</a:t>
             </a:fld>
             <a:endParaRPr lang="en-US"/>
           </a:p>
@@ -865,7 +866,7 @@
           <a:p>
             <a:fld id="{5B9A50E9-7867-4611-83A7-BE32F136494E}" type="datetimeFigureOut">
               <a:rPr lang="en-US" smtClean="0"/>
-              <a:t>7/1/2020</a:t>
+              <a:t>7/10/2020</a:t>
             </a:fld>
             <a:endParaRPr lang="en-US"/>
           </a:p>
@@ -1140,7 +1141,7 @@
           <a:p>
             <a:fld id="{5B9A50E9-7867-4611-83A7-BE32F136494E}" type="datetimeFigureOut">
               <a:rPr lang="en-US" smtClean="0"/>
-              <a:t>7/1/2020</a:t>
+              <a:t>7/10/2020</a:t>
             </a:fld>
             <a:endParaRPr lang="en-US"/>
           </a:p>
@@ -1405,7 +1406,7 @@
           <a:p>
             <a:fld id="{5B9A50E9-7867-4611-83A7-BE32F136494E}" type="datetimeFigureOut">
               <a:rPr lang="en-US" smtClean="0"/>
-              <a:t>7/1/2020</a:t>
+              <a:t>7/10/2020</a:t>
             </a:fld>
             <a:endParaRPr lang="en-US"/>
           </a:p>
@@ -1817,7 +1818,7 @@
           <a:p>
             <a:fld id="{5B9A50E9-7867-4611-83A7-BE32F136494E}" type="datetimeFigureOut">
               <a:rPr lang="en-US" smtClean="0"/>
-              <a:t>7/1/2020</a:t>
+              <a:t>7/10/2020</a:t>
             </a:fld>
             <a:endParaRPr lang="en-US"/>
           </a:p>
@@ -1958,7 +1959,7 @@
           <a:p>
             <a:fld id="{5B9A50E9-7867-4611-83A7-BE32F136494E}" type="datetimeFigureOut">
               <a:rPr lang="en-US" smtClean="0"/>
-              <a:t>7/1/2020</a:t>
+              <a:t>7/10/2020</a:t>
             </a:fld>
             <a:endParaRPr lang="en-US"/>
           </a:p>
@@ -2071,7 +2072,7 @@
           <a:p>
             <a:fld id="{5B9A50E9-7867-4611-83A7-BE32F136494E}" type="datetimeFigureOut">
               <a:rPr lang="en-US" smtClean="0"/>
-              <a:t>7/1/2020</a:t>
+              <a:t>7/10/2020</a:t>
             </a:fld>
             <a:endParaRPr lang="en-US"/>
           </a:p>
@@ -2382,7 +2383,7 @@
           <a:p>
             <a:fld id="{5B9A50E9-7867-4611-83A7-BE32F136494E}" type="datetimeFigureOut">
               <a:rPr lang="en-US" smtClean="0"/>
-              <a:t>7/1/2020</a:t>
+              <a:t>7/10/2020</a:t>
             </a:fld>
             <a:endParaRPr lang="en-US"/>
           </a:p>
@@ -2670,7 +2671,7 @@
           <a:p>
             <a:fld id="{5B9A50E9-7867-4611-83A7-BE32F136494E}" type="datetimeFigureOut">
               <a:rPr lang="en-US" smtClean="0"/>
-              <a:t>7/1/2020</a:t>
+              <a:t>7/10/2020</a:t>
             </a:fld>
             <a:endParaRPr lang="en-US"/>
           </a:p>
@@ -2911,7 +2912,7 @@
           <a:p>
             <a:fld id="{5B9A50E9-7867-4611-83A7-BE32F136494E}" type="datetimeFigureOut">
               <a:rPr lang="en-US" smtClean="0"/>
-              <a:t>7/1/2020</a:t>
+              <a:t>7/10/2020</a:t>
             </a:fld>
             <a:endParaRPr lang="en-US"/>
           </a:p>
@@ -3880,6 +3881,108 @@
 </p:sld>
 </file>
 
+<file path=ppt/slides/slide4.xml><?xml version="1.0" encoding="utf-8"?>
+<p:sld xmlns:a="http://schemas.openxmlformats.org/drawingml/2006/main" xmlns:r="http://schemas.openxmlformats.org/officeDocument/2006/relationships" xmlns:p="http://schemas.openxmlformats.org/presentationml/2006/main">
+  <p:cSld>
+    <p:spTree>
+      <p:nvGrpSpPr>
+        <p:cNvPr id="1" name=""/>
+        <p:cNvGrpSpPr/>
+        <p:nvPr/>
+      </p:nvGrpSpPr>
+      <p:grpSpPr>
+        <a:xfrm>
+          <a:off x="0" y="0"/>
+          <a:ext cx="0" cy="0"/>
+          <a:chOff x="0" y="0"/>
+          <a:chExt cx="0" cy="0"/>
+        </a:xfrm>
+      </p:grpSpPr>
+      <p:pic>
+        <p:nvPicPr>
+          <p:cNvPr id="5" name="Picture 4" descr="A close up of a logo&#10;&#10;Description automatically generated">
+            <a:extLst>
+              <a:ext uri="{FF2B5EF4-FFF2-40B4-BE49-F238E27FC236}">
+                <a16:creationId xmlns:a16="http://schemas.microsoft.com/office/drawing/2014/main" id="{063F37FA-7BFB-413D-A71B-33783A093027}"/>
+              </a:ext>
+            </a:extLst>
+          </p:cNvPr>
+          <p:cNvPicPr>
+            <a:picLocks noChangeAspect="1"/>
+          </p:cNvPicPr>
+          <p:nvPr/>
+        </p:nvPicPr>
+        <p:blipFill>
+          <a:blip r:embed="rId2">
+            <a:extLst>
+              <a:ext uri="{28A0092B-C50C-407E-A947-70E740481C1C}">
+                <a14:useLocalDpi xmlns:a14="http://schemas.microsoft.com/office/drawing/2010/main" val="0"/>
+              </a:ext>
+            </a:extLst>
+          </a:blip>
+          <a:stretch>
+            <a:fillRect/>
+          </a:stretch>
+        </p:blipFill>
+        <p:spPr>
+          <a:xfrm>
+            <a:off x="-2562225" y="0"/>
+            <a:ext cx="14754225" cy="6858000"/>
+          </a:xfrm>
+          <a:prstGeom prst="rect">
+            <a:avLst/>
+          </a:prstGeom>
+        </p:spPr>
+      </p:pic>
+      <p:pic>
+        <p:nvPicPr>
+          <p:cNvPr id="3" name="Picture 2">
+            <a:extLst>
+              <a:ext uri="{FF2B5EF4-FFF2-40B4-BE49-F238E27FC236}">
+                <a16:creationId xmlns:a16="http://schemas.microsoft.com/office/drawing/2014/main" id="{D53C0AB9-9351-427C-A1F0-FFAA0C210BF3}"/>
+              </a:ext>
+            </a:extLst>
+          </p:cNvPr>
+          <p:cNvPicPr>
+            <a:picLocks noChangeAspect="1"/>
+          </p:cNvPicPr>
+          <p:nvPr/>
+        </p:nvPicPr>
+        <p:blipFill>
+          <a:blip r:embed="rId3">
+            <a:extLst>
+              <a:ext uri="{28A0092B-C50C-407E-A947-70E740481C1C}">
+                <a14:useLocalDpi xmlns:a14="http://schemas.microsoft.com/office/drawing/2010/main" val="0"/>
+              </a:ext>
+            </a:extLst>
+          </a:blip>
+          <a:stretch>
+            <a:fillRect/>
+          </a:stretch>
+        </p:blipFill>
+        <p:spPr>
+          <a:xfrm>
+            <a:off x="281349" y="4415653"/>
+            <a:ext cx="2080851" cy="2198813"/>
+          </a:xfrm>
+          <a:prstGeom prst="rect">
+            <a:avLst/>
+          </a:prstGeom>
+        </p:spPr>
+      </p:pic>
+    </p:spTree>
+    <p:extLst>
+      <p:ext uri="{BB962C8B-B14F-4D97-AF65-F5344CB8AC3E}">
+        <p14:creationId xmlns:p14="http://schemas.microsoft.com/office/powerpoint/2010/main" val="2550259363"/>
+      </p:ext>
+    </p:extLst>
+  </p:cSld>
+  <p:clrMapOvr>
+    <a:masterClrMapping/>
+  </p:clrMapOvr>
+</p:sld>
+</file>
+
 <file path=ppt/theme/theme1.xml><?xml version="1.0" encoding="utf-8"?>
 <a:theme xmlns:a="http://schemas.openxmlformats.org/drawingml/2006/main" name="Office Theme">
   <a:themeElements>

</xml_diff>

<commit_message>
changes for cutover to new channels
</commit_message>
<xml_diff>
--- a/media/bumpers/Bumpers.pptx
+++ b/media/bumpers/Bumpers.pptx
@@ -11,6 +11,10 @@
     <p:sldId id="260" r:id="rId5"/>
     <p:sldId id="262" r:id="rId6"/>
     <p:sldId id="261" r:id="rId7"/>
+    <p:sldId id="263" r:id="rId8"/>
+    <p:sldId id="264" r:id="rId9"/>
+    <p:sldId id="265" r:id="rId10"/>
+    <p:sldId id="266" r:id="rId11"/>
   </p:sldIdLst>
   <p:sldSz cx="12192000" cy="6858000"/>
   <p:notesSz cx="6858000" cy="9144000"/>
@@ -275,7 +279,7 @@
           <a:p>
             <a:fld id="{5B9A50E9-7867-4611-83A7-BE32F136494E}" type="datetimeFigureOut">
               <a:rPr lang="en-US" smtClean="0"/>
-              <a:t>7/10/2020</a:t>
+              <a:t>8/21/2020</a:t>
             </a:fld>
             <a:endParaRPr lang="en-US"/>
           </a:p>
@@ -473,7 +477,7 @@
           <a:p>
             <a:fld id="{5B9A50E9-7867-4611-83A7-BE32F136494E}" type="datetimeFigureOut">
               <a:rPr lang="en-US" smtClean="0"/>
-              <a:t>7/10/2020</a:t>
+              <a:t>8/21/2020</a:t>
             </a:fld>
             <a:endParaRPr lang="en-US"/>
           </a:p>
@@ -681,7 +685,7 @@
           <a:p>
             <a:fld id="{5B9A50E9-7867-4611-83A7-BE32F136494E}" type="datetimeFigureOut">
               <a:rPr lang="en-US" smtClean="0"/>
-              <a:t>7/10/2020</a:t>
+              <a:t>8/21/2020</a:t>
             </a:fld>
             <a:endParaRPr lang="en-US"/>
           </a:p>
@@ -879,7 +883,7 @@
           <a:p>
             <a:fld id="{5B9A50E9-7867-4611-83A7-BE32F136494E}" type="datetimeFigureOut">
               <a:rPr lang="en-US" smtClean="0"/>
-              <a:t>7/10/2020</a:t>
+              <a:t>8/21/2020</a:t>
             </a:fld>
             <a:endParaRPr lang="en-US"/>
           </a:p>
@@ -1154,7 +1158,7 @@
           <a:p>
             <a:fld id="{5B9A50E9-7867-4611-83A7-BE32F136494E}" type="datetimeFigureOut">
               <a:rPr lang="en-US" smtClean="0"/>
-              <a:t>7/10/2020</a:t>
+              <a:t>8/21/2020</a:t>
             </a:fld>
             <a:endParaRPr lang="en-US"/>
           </a:p>
@@ -1419,7 +1423,7 @@
           <a:p>
             <a:fld id="{5B9A50E9-7867-4611-83A7-BE32F136494E}" type="datetimeFigureOut">
               <a:rPr lang="en-US" smtClean="0"/>
-              <a:t>7/10/2020</a:t>
+              <a:t>8/21/2020</a:t>
             </a:fld>
             <a:endParaRPr lang="en-US"/>
           </a:p>
@@ -1831,7 +1835,7 @@
           <a:p>
             <a:fld id="{5B9A50E9-7867-4611-83A7-BE32F136494E}" type="datetimeFigureOut">
               <a:rPr lang="en-US" smtClean="0"/>
-              <a:t>7/10/2020</a:t>
+              <a:t>8/21/2020</a:t>
             </a:fld>
             <a:endParaRPr lang="en-US"/>
           </a:p>
@@ -1972,7 +1976,7 @@
           <a:p>
             <a:fld id="{5B9A50E9-7867-4611-83A7-BE32F136494E}" type="datetimeFigureOut">
               <a:rPr lang="en-US" smtClean="0"/>
-              <a:t>7/10/2020</a:t>
+              <a:t>8/21/2020</a:t>
             </a:fld>
             <a:endParaRPr lang="en-US"/>
           </a:p>
@@ -2085,7 +2089,7 @@
           <a:p>
             <a:fld id="{5B9A50E9-7867-4611-83A7-BE32F136494E}" type="datetimeFigureOut">
               <a:rPr lang="en-US" smtClean="0"/>
-              <a:t>7/10/2020</a:t>
+              <a:t>8/21/2020</a:t>
             </a:fld>
             <a:endParaRPr lang="en-US"/>
           </a:p>
@@ -2396,7 +2400,7 @@
           <a:p>
             <a:fld id="{5B9A50E9-7867-4611-83A7-BE32F136494E}" type="datetimeFigureOut">
               <a:rPr lang="en-US" smtClean="0"/>
-              <a:t>7/10/2020</a:t>
+              <a:t>8/21/2020</a:t>
             </a:fld>
             <a:endParaRPr lang="en-US"/>
           </a:p>
@@ -2684,7 +2688,7 @@
           <a:p>
             <a:fld id="{5B9A50E9-7867-4611-83A7-BE32F136494E}" type="datetimeFigureOut">
               <a:rPr lang="en-US" smtClean="0"/>
-              <a:t>7/10/2020</a:t>
+              <a:t>8/21/2020</a:t>
             </a:fld>
             <a:endParaRPr lang="en-US"/>
           </a:p>
@@ -2931,7 +2935,7 @@
           <a:p>
             <a:fld id="{5B9A50E9-7867-4611-83A7-BE32F136494E}" type="datetimeFigureOut">
               <a:rPr lang="en-US" smtClean="0"/>
-              <a:t>7/10/2020</a:t>
+              <a:t>8/21/2020</a:t>
             </a:fld>
             <a:endParaRPr lang="en-US"/>
           </a:p>
@@ -3412,7 +3416,7 @@
         </p:blipFill>
         <p:spPr>
           <a:xfrm>
-            <a:off x="0" y="723712"/>
+            <a:off x="0" y="148126"/>
             <a:ext cx="12192000" cy="6706525"/>
           </a:xfrm>
           <a:prstGeom prst="rect">
@@ -3435,8 +3439,8 @@
         </p:nvSpPr>
         <p:spPr>
           <a:xfrm>
-            <a:off x="177531" y="101063"/>
-            <a:ext cx="6736514" cy="1754326"/>
+            <a:off x="2096185" y="2434381"/>
+            <a:ext cx="7999629" cy="584775"/>
           </a:xfrm>
           <a:prstGeom prst="rect">
             <a:avLst/>
@@ -3456,28 +3460,7 @@
           </a:bodyPr>
           <a:lstStyle/>
           <a:p>
-            <a:r>
-              <a:rPr lang="en-US" sz="4000" b="1" dirty="0">
-                <a:ln w="19050">
-                  <a:solidFill>
-                    <a:schemeClr val="tx1"/>
-                  </a:solidFill>
-                </a:ln>
-                <a:solidFill>
-                  <a:schemeClr val="bg1"/>
-                </a:solidFill>
-                <a:effectLst>
-                  <a:outerShdw blurRad="38100" dist="19050" dir="2700000" algn="tl" rotWithShape="0">
-                    <a:schemeClr val="dk1">
-                      <a:alpha val="40000"/>
-                    </a:schemeClr>
-                  </a:outerShdw>
-                </a:effectLst>
-              </a:rPr>
-              <a:t>The .NET Docs Show</a:t>
-            </a:r>
-          </a:p>
-          <a:p>
+            <a:pPr algn="ctr"/>
             <a:r>
               <a:rPr lang="en-US" sz="3200" b="1" dirty="0">
                 <a:ln w="19050">
@@ -3496,37 +3479,381 @@
                   </a:outerShdw>
                 </a:effectLst>
               </a:rPr>
-              <a:t>Stream starts at 11:00 AM US/Central!</a:t>
-            </a:r>
-          </a:p>
-          <a:p>
-            <a:r>
-              <a:rPr lang="en-US" sz="3600" b="1" dirty="0">
-                <a:ln w="19050">
-                  <a:solidFill>
-                    <a:schemeClr val="tx1"/>
-                  </a:solidFill>
-                </a:ln>
-                <a:solidFill>
-                  <a:schemeClr val="bg1"/>
-                </a:solidFill>
-                <a:effectLst>
-                  <a:outerShdw blurRad="38100" dist="19050" dir="2700000" algn="tl" rotWithShape="0">
-                    <a:schemeClr val="dk1">
-                      <a:alpha val="40000"/>
-                    </a:schemeClr>
-                  </a:outerShdw>
-                </a:effectLst>
-              </a:rPr>
-              <a:t>https://dotnetdocs.dev</a:t>
-            </a:r>
-          </a:p>
-        </p:txBody>
-      </p:sp>
+              <a:t>Starting at 11:00 AM US/Central (16:00 UTC)!</a:t>
+            </a:r>
+          </a:p>
+        </p:txBody>
+      </p:sp>
+      <p:pic>
+        <p:nvPicPr>
+          <p:cNvPr id="2" name="Picture 1">
+            <a:extLst>
+              <a:ext uri="{FF2B5EF4-FFF2-40B4-BE49-F238E27FC236}">
+                <a16:creationId xmlns:a16="http://schemas.microsoft.com/office/drawing/2014/main" id="{DDE59ACA-0135-4DCF-A53F-4078EAA2C5B2}"/>
+              </a:ext>
+            </a:extLst>
+          </p:cNvPr>
+          <p:cNvPicPr>
+            <a:picLocks noChangeAspect="1"/>
+          </p:cNvPicPr>
+          <p:nvPr/>
+        </p:nvPicPr>
+        <p:blipFill>
+          <a:blip r:embed="rId4"/>
+          <a:stretch>
+            <a:fillRect/>
+          </a:stretch>
+        </p:blipFill>
+        <p:spPr>
+          <a:xfrm>
+            <a:off x="4036694" y="148126"/>
+            <a:ext cx="4401205" cy="2430517"/>
+          </a:xfrm>
+          <a:prstGeom prst="rect">
+            <a:avLst/>
+          </a:prstGeom>
+        </p:spPr>
+      </p:pic>
     </p:spTree>
     <p:extLst>
       <p:ext uri="{BB962C8B-B14F-4D97-AF65-F5344CB8AC3E}">
         <p14:creationId xmlns:p14="http://schemas.microsoft.com/office/powerpoint/2010/main" val="405907332"/>
+      </p:ext>
+    </p:extLst>
+  </p:cSld>
+  <p:clrMapOvr>
+    <a:masterClrMapping/>
+  </p:clrMapOvr>
+</p:sld>
+</file>
+
+<file path=ppt/slides/slide10.xml><?xml version="1.0" encoding="utf-8"?>
+<p:sld xmlns:a="http://schemas.openxmlformats.org/drawingml/2006/main" xmlns:r="http://schemas.openxmlformats.org/officeDocument/2006/relationships" xmlns:p="http://schemas.openxmlformats.org/presentationml/2006/main">
+  <p:cSld>
+    <p:spTree>
+      <p:nvGrpSpPr>
+        <p:cNvPr id="1" name=""/>
+        <p:cNvGrpSpPr/>
+        <p:nvPr/>
+      </p:nvGrpSpPr>
+      <p:grpSpPr>
+        <a:xfrm>
+          <a:off x="0" y="0"/>
+          <a:ext cx="0" cy="0"/>
+          <a:chOff x="0" y="0"/>
+          <a:chExt cx="0" cy="0"/>
+        </a:xfrm>
+      </p:grpSpPr>
+      <p:pic>
+        <p:nvPicPr>
+          <p:cNvPr id="2" name="Picture 1">
+            <a:extLst>
+              <a:ext uri="{FF2B5EF4-FFF2-40B4-BE49-F238E27FC236}">
+                <a16:creationId xmlns:a16="http://schemas.microsoft.com/office/drawing/2014/main" id="{C9CC8715-D0B6-4BCB-9F57-E9174DBD79AE}"/>
+              </a:ext>
+            </a:extLst>
+          </p:cNvPr>
+          <p:cNvPicPr>
+            <a:picLocks noChangeAspect="1"/>
+          </p:cNvPicPr>
+          <p:nvPr/>
+        </p:nvPicPr>
+        <p:blipFill>
+          <a:blip r:embed="rId2"/>
+          <a:stretch>
+            <a:fillRect/>
+          </a:stretch>
+        </p:blipFill>
+        <p:spPr>
+          <a:xfrm>
+            <a:off x="-1" y="0"/>
+            <a:ext cx="12192000" cy="6858000"/>
+          </a:xfrm>
+          <a:prstGeom prst="rect">
+            <a:avLst/>
+          </a:prstGeom>
+        </p:spPr>
+      </p:pic>
+      <p:pic>
+        <p:nvPicPr>
+          <p:cNvPr id="3" name="Picture 2">
+            <a:extLst>
+              <a:ext uri="{FF2B5EF4-FFF2-40B4-BE49-F238E27FC236}">
+                <a16:creationId xmlns:a16="http://schemas.microsoft.com/office/drawing/2014/main" id="{D53C0AB9-9351-427C-A1F0-FFAA0C210BF3}"/>
+              </a:ext>
+            </a:extLst>
+          </p:cNvPr>
+          <p:cNvPicPr>
+            <a:picLocks noChangeAspect="1"/>
+          </p:cNvPicPr>
+          <p:nvPr/>
+        </p:nvPicPr>
+        <p:blipFill>
+          <a:blip r:embed="rId3">
+            <a:extLst>
+              <a:ext uri="{28A0092B-C50C-407E-A947-70E740481C1C}">
+                <a14:useLocalDpi xmlns:a14="http://schemas.microsoft.com/office/drawing/2010/main" val="0"/>
+              </a:ext>
+            </a:extLst>
+          </a:blip>
+          <a:stretch>
+            <a:fillRect/>
+          </a:stretch>
+        </p:blipFill>
+        <p:spPr>
+          <a:xfrm flipH="1">
+            <a:off x="9196941" y="3763788"/>
+            <a:ext cx="2844935" cy="3006212"/>
+          </a:xfrm>
+          <a:prstGeom prst="rect">
+            <a:avLst/>
+          </a:prstGeom>
+        </p:spPr>
+      </p:pic>
+      <p:pic>
+        <p:nvPicPr>
+          <p:cNvPr id="6" name="Picture 5">
+            <a:extLst>
+              <a:ext uri="{FF2B5EF4-FFF2-40B4-BE49-F238E27FC236}">
+                <a16:creationId xmlns:a16="http://schemas.microsoft.com/office/drawing/2014/main" id="{7323B507-65B1-46AE-9EF3-A7409FEABD9D}"/>
+              </a:ext>
+            </a:extLst>
+          </p:cNvPr>
+          <p:cNvPicPr>
+            <a:picLocks noChangeAspect="1"/>
+          </p:cNvPicPr>
+          <p:nvPr/>
+        </p:nvPicPr>
+        <p:blipFill>
+          <a:blip r:embed="rId4"/>
+          <a:stretch>
+            <a:fillRect/>
+          </a:stretch>
+        </p:blipFill>
+        <p:spPr>
+          <a:xfrm>
+            <a:off x="3608257" y="178425"/>
+            <a:ext cx="4975483" cy="2747655"/>
+          </a:xfrm>
+          <a:prstGeom prst="rect">
+            <a:avLst/>
+          </a:prstGeom>
+        </p:spPr>
+      </p:pic>
+      <p:sp>
+        <p:nvSpPr>
+          <p:cNvPr id="4" name="TextBox 3">
+            <a:extLst>
+              <a:ext uri="{FF2B5EF4-FFF2-40B4-BE49-F238E27FC236}">
+                <a16:creationId xmlns:a16="http://schemas.microsoft.com/office/drawing/2014/main" id="{B28DD75E-2A17-4140-BE31-0EA279E602FC}"/>
+              </a:ext>
+            </a:extLst>
+          </p:cNvPr>
+          <p:cNvSpPr txBox="1"/>
+          <p:nvPr/>
+        </p:nvSpPr>
+        <p:spPr>
+          <a:xfrm>
+            <a:off x="412954" y="2926080"/>
+            <a:ext cx="6359505" cy="2215991"/>
+          </a:xfrm>
+          <a:prstGeom prst="rect">
+            <a:avLst/>
+          </a:prstGeom>
+          <a:noFill/>
+        </p:spPr>
+        <p:txBody>
+          <a:bodyPr wrap="square" rtlCol="0">
+            <a:spAutoFit/>
+          </a:bodyPr>
+          <a:lstStyle/>
+          <a:p>
+            <a:r>
+              <a:rPr lang="en-US" sz="3200" dirty="0">
+                <a:solidFill>
+                  <a:schemeClr val="bg2"/>
+                </a:solidFill>
+              </a:rPr>
+              <a:t>This week:</a:t>
+            </a:r>
+            <a:br>
+              <a:rPr lang="en-US" dirty="0">
+                <a:solidFill>
+                  <a:schemeClr val="bg2"/>
+                </a:solidFill>
+              </a:rPr>
+            </a:br>
+            <a:br>
+              <a:rPr lang="en-US" dirty="0">
+                <a:solidFill>
+                  <a:schemeClr val="bg2"/>
+                </a:solidFill>
+              </a:rPr>
+            </a:br>
+            <a:r>
+              <a:rPr lang="en-US" sz="4400" b="1" dirty="0">
+                <a:solidFill>
+                  <a:schemeClr val="bg2"/>
+                </a:solidFill>
+              </a:rPr>
+              <a:t>Exploring ASP.NET Core + Vue.js </a:t>
+            </a:r>
+            <a:r>
+              <a:rPr lang="en-US" sz="4400" dirty="0">
+                <a:solidFill>
+                  <a:schemeClr val="bg2"/>
+                </a:solidFill>
+              </a:rPr>
+              <a:t>with</a:t>
+            </a:r>
+            <a:r>
+              <a:rPr lang="en-US" sz="4400" b="1" dirty="0">
+                <a:solidFill>
+                  <a:schemeClr val="bg2"/>
+                </a:solidFill>
+              </a:rPr>
+              <a:t> Matt </a:t>
+            </a:r>
+            <a:r>
+              <a:rPr lang="en-US" sz="4400" b="1" dirty="0" err="1">
+                <a:solidFill>
+                  <a:schemeClr val="bg2"/>
+                </a:solidFill>
+              </a:rPr>
+              <a:t>Millican</a:t>
+            </a:r>
+            <a:endParaRPr lang="en-US" b="1" dirty="0">
+              <a:solidFill>
+                <a:schemeClr val="bg2"/>
+              </a:solidFill>
+            </a:endParaRPr>
+          </a:p>
+        </p:txBody>
+      </p:sp>
+      <p:sp>
+        <p:nvSpPr>
+          <p:cNvPr id="5" name="TextBox 4">
+            <a:extLst>
+              <a:ext uri="{FF2B5EF4-FFF2-40B4-BE49-F238E27FC236}">
+                <a16:creationId xmlns:a16="http://schemas.microsoft.com/office/drawing/2014/main" id="{0B382353-7470-4A32-B921-9E9C3C2F6BEE}"/>
+              </a:ext>
+            </a:extLst>
+          </p:cNvPr>
+          <p:cNvSpPr txBox="1"/>
+          <p:nvPr/>
+        </p:nvSpPr>
+        <p:spPr>
+          <a:xfrm>
+            <a:off x="412954" y="5767201"/>
+            <a:ext cx="9615949" cy="769441"/>
+          </a:xfrm>
+          <a:prstGeom prst="rect">
+            <a:avLst/>
+          </a:prstGeom>
+          <a:noFill/>
+        </p:spPr>
+        <p:txBody>
+          <a:bodyPr wrap="square" rtlCol="0">
+            <a:spAutoFit/>
+          </a:bodyPr>
+          <a:lstStyle/>
+          <a:p>
+            <a:r>
+              <a:rPr lang="en-US" sz="4400" b="1" dirty="0">
+                <a:solidFill>
+                  <a:schemeClr val="bg2"/>
+                </a:solidFill>
+              </a:rPr>
+              <a:t>Monday</a:t>
+            </a:r>
+            <a:r>
+              <a:rPr lang="en-US" sz="4400" dirty="0">
+                <a:solidFill>
+                  <a:schemeClr val="bg2"/>
+                </a:solidFill>
+              </a:rPr>
+              <a:t> | 11 AM US/Central (16:00 UTC)</a:t>
+            </a:r>
+            <a:endParaRPr lang="en-US" dirty="0">
+              <a:solidFill>
+                <a:schemeClr val="bg2"/>
+              </a:solidFill>
+            </a:endParaRPr>
+          </a:p>
+        </p:txBody>
+      </p:sp>
+      <p:pic>
+        <p:nvPicPr>
+          <p:cNvPr id="1028" name="Picture 4">
+            <a:extLst>
+              <a:ext uri="{FF2B5EF4-FFF2-40B4-BE49-F238E27FC236}">
+                <a16:creationId xmlns:a16="http://schemas.microsoft.com/office/drawing/2014/main" id="{684443C6-40D8-4CBB-9A63-102612CC817A}"/>
+              </a:ext>
+            </a:extLst>
+          </p:cNvPr>
+          <p:cNvPicPr>
+            <a:picLocks noChangeAspect="1" noChangeArrowheads="1"/>
+          </p:cNvPicPr>
+          <p:nvPr/>
+        </p:nvPicPr>
+        <p:blipFill>
+          <a:blip r:embed="rId5">
+            <a:extLst>
+              <a:ext uri="{28A0092B-C50C-407E-A947-70E740481C1C}">
+                <a14:useLocalDpi xmlns:a14="http://schemas.microsoft.com/office/drawing/2010/main" val="0"/>
+              </a:ext>
+            </a:extLst>
+          </a:blip>
+          <a:srcRect/>
+          <a:stretch/>
+        </p:blipFill>
+        <p:spPr bwMode="auto">
+          <a:xfrm>
+            <a:off x="6928217" y="3429000"/>
+            <a:ext cx="1786497" cy="1786497"/>
+          </a:xfrm>
+          <a:prstGeom prst="ellipse">
+            <a:avLst/>
+          </a:prstGeom>
+          <a:ln w="63500" cap="rnd">
+            <a:solidFill>
+              <a:srgbClr val="333333"/>
+            </a:solidFill>
+          </a:ln>
+          <a:effectLst>
+            <a:outerShdw blurRad="381000" dist="292100" dir="5400000" sx="-80000" sy="-18000" rotWithShape="0">
+              <a:srgbClr val="000000">
+                <a:alpha val="22000"/>
+              </a:srgbClr>
+            </a:outerShdw>
+          </a:effectLst>
+          <a:scene3d>
+            <a:camera prst="orthographicFront"/>
+            <a:lightRig rig="contrasting" dir="t">
+              <a:rot lat="0" lon="0" rev="3000000"/>
+            </a:lightRig>
+          </a:scene3d>
+          <a:sp3d contourW="7620">
+            <a:bevelT w="95250" h="31750"/>
+            <a:contourClr>
+              <a:srgbClr val="333333"/>
+            </a:contourClr>
+          </a:sp3d>
+          <a:extLst>
+            <a:ext uri="{909E8E84-426E-40DD-AFC4-6F175D3DCCD1}">
+              <a14:hiddenFill xmlns:a14="http://schemas.microsoft.com/office/drawing/2010/main">
+                <a:solidFill>
+                  <a:srgbClr val="FFFFFF"/>
+                </a:solidFill>
+              </a14:hiddenFill>
+            </a:ext>
+          </a:extLst>
+        </p:spPr>
+      </p:pic>
+    </p:spTree>
+    <p:extLst>
+      <p:ext uri="{BB962C8B-B14F-4D97-AF65-F5344CB8AC3E}">
+        <p14:creationId xmlns:p14="http://schemas.microsoft.com/office/powerpoint/2010/main" val="830939312"/>
       </p:ext>
     </p:extLst>
   </p:cSld>
@@ -3617,8 +3944,8 @@
         </p:blipFill>
         <p:spPr>
           <a:xfrm>
-            <a:off x="228083" y="1362071"/>
-            <a:ext cx="10188761" cy="5650788"/>
+            <a:off x="95916" y="383919"/>
+            <a:ext cx="12000167" cy="6655412"/>
           </a:xfrm>
           <a:prstGeom prst="rect">
             <a:avLst/>
@@ -3639,8 +3966,8 @@
         </p:nvSpPr>
         <p:spPr>
           <a:xfrm>
-            <a:off x="177531" y="101063"/>
-            <a:ext cx="6736514" cy="1754326"/>
+            <a:off x="2269375" y="4849624"/>
+            <a:ext cx="9922625" cy="1384995"/>
           </a:xfrm>
           <a:prstGeom prst="rect">
             <a:avLst/>
@@ -3660,6 +3987,7 @@
           </a:bodyPr>
           <a:lstStyle/>
           <a:p>
+            <a:pPr algn="r"/>
             <a:r>
               <a:rPr lang="en-US" sz="4000" b="1" dirty="0">
                 <a:ln w="19050">
@@ -3678,34 +4006,13 @@
                   </a:outerShdw>
                 </a:effectLst>
               </a:rPr>
-              <a:t>The .NET Docs Show</a:t>
-            </a:r>
-          </a:p>
-          <a:p>
-            <a:r>
-              <a:rPr lang="en-US" sz="3200" b="1" dirty="0">
-                <a:ln w="19050">
-                  <a:solidFill>
-                    <a:schemeClr val="tx1"/>
-                  </a:solidFill>
-                </a:ln>
-                <a:solidFill>
-                  <a:schemeClr val="bg1"/>
-                </a:solidFill>
-                <a:effectLst>
-                  <a:outerShdw blurRad="38100" dist="19050" dir="2700000" algn="tl" rotWithShape="0">
-                    <a:schemeClr val="dk1">
-                      <a:alpha val="40000"/>
-                    </a:schemeClr>
-                  </a:outerShdw>
-                </a:effectLst>
-              </a:rPr>
-              <a:t>Thursdays at 11:00 AM US/Central</a:t>
-            </a:r>
-          </a:p>
-          <a:p>
-            <a:r>
-              <a:rPr lang="en-US" sz="3600" b="1" dirty="0">
+              <a:t>Mondays at 11:00 AM US/Central (16:00 UTC)</a:t>
+            </a:r>
+          </a:p>
+          <a:p>
+            <a:pPr algn="r"/>
+            <a:r>
+              <a:rPr lang="en-US" sz="4400" b="1" dirty="0">
                 <a:ln w="19050">
                   <a:solidFill>
                     <a:schemeClr val="tx1"/>
@@ -3727,6 +4034,36 @@
           </a:p>
         </p:txBody>
       </p:sp>
+      <p:pic>
+        <p:nvPicPr>
+          <p:cNvPr id="2" name="Picture 1">
+            <a:extLst>
+              <a:ext uri="{FF2B5EF4-FFF2-40B4-BE49-F238E27FC236}">
+                <a16:creationId xmlns:a16="http://schemas.microsoft.com/office/drawing/2014/main" id="{549BB72C-D3F9-40B2-8F52-EBBA15AC8F1B}"/>
+              </a:ext>
+            </a:extLst>
+          </p:cNvPr>
+          <p:cNvPicPr>
+            <a:picLocks noChangeAspect="1"/>
+          </p:cNvPicPr>
+          <p:nvPr/>
+        </p:nvPicPr>
+        <p:blipFill>
+          <a:blip r:embed="rId4"/>
+          <a:stretch>
+            <a:fillRect/>
+          </a:stretch>
+        </p:blipFill>
+        <p:spPr>
+          <a:xfrm>
+            <a:off x="95916" y="181331"/>
+            <a:ext cx="4401205" cy="2430517"/>
+          </a:xfrm>
+          <a:prstGeom prst="rect">
+            <a:avLst/>
+          </a:prstGeom>
+        </p:spPr>
+      </p:pic>
     </p:spTree>
     <p:extLst>
       <p:ext uri="{BB962C8B-B14F-4D97-AF65-F5344CB8AC3E}">
@@ -3843,8 +4180,8 @@
         </p:nvSpPr>
         <p:spPr>
           <a:xfrm>
-            <a:off x="1254059" y="588341"/>
-            <a:ext cx="4657434" cy="1323439"/>
+            <a:off x="428150" y="2578643"/>
+            <a:ext cx="4657434" cy="707886"/>
           </a:xfrm>
           <a:prstGeom prst="rect">
             <a:avLst/>
@@ -3864,6 +4201,7 @@
           </a:bodyPr>
           <a:lstStyle/>
           <a:p>
+            <a:pPr algn="ctr"/>
             <a:r>
               <a:rPr lang="en-US" sz="4000" b="1" dirty="0">
                 <a:ln w="19050">
@@ -3882,11 +4220,41 @@
                   </a:outerShdw>
                 </a:effectLst>
               </a:rPr>
-              <a:t>The .NET Docs Show will be right back!</a:t>
-            </a:r>
-          </a:p>
-        </p:txBody>
-      </p:sp>
+              <a:t>will be right back!</a:t>
+            </a:r>
+          </a:p>
+        </p:txBody>
+      </p:sp>
+      <p:pic>
+        <p:nvPicPr>
+          <p:cNvPr id="2" name="Picture 1">
+            <a:extLst>
+              <a:ext uri="{FF2B5EF4-FFF2-40B4-BE49-F238E27FC236}">
+                <a16:creationId xmlns:a16="http://schemas.microsoft.com/office/drawing/2014/main" id="{0B4E3841-07AF-448B-A46D-3F1273279508}"/>
+              </a:ext>
+            </a:extLst>
+          </p:cNvPr>
+          <p:cNvPicPr>
+            <a:picLocks noChangeAspect="1"/>
+          </p:cNvPicPr>
+          <p:nvPr/>
+        </p:nvPicPr>
+        <p:blipFill>
+          <a:blip r:embed="rId4"/>
+          <a:stretch>
+            <a:fillRect/>
+          </a:stretch>
+        </p:blipFill>
+        <p:spPr>
+          <a:xfrm>
+            <a:off x="725459" y="246448"/>
+            <a:ext cx="4401205" cy="2430517"/>
+          </a:xfrm>
+          <a:prstGeom prst="rect">
+            <a:avLst/>
+          </a:prstGeom>
+        </p:spPr>
+      </p:pic>
     </p:spTree>
     <p:extLst>
       <p:ext uri="{BB962C8B-B14F-4D97-AF65-F5344CB8AC3E}">
@@ -4306,6 +4674,590 @@
     <p:extLst>
       <p:ext uri="{BB962C8B-B14F-4D97-AF65-F5344CB8AC3E}">
         <p14:creationId xmlns:p14="http://schemas.microsoft.com/office/powerpoint/2010/main" val="2912913381"/>
+      </p:ext>
+    </p:extLst>
+  </p:cSld>
+  <p:clrMapOvr>
+    <a:masterClrMapping/>
+  </p:clrMapOvr>
+</p:sld>
+</file>
+
+<file path=ppt/slides/slide7.xml><?xml version="1.0" encoding="utf-8"?>
+<p:sld xmlns:a="http://schemas.openxmlformats.org/drawingml/2006/main" xmlns:r="http://schemas.openxmlformats.org/officeDocument/2006/relationships" xmlns:p="http://schemas.openxmlformats.org/presentationml/2006/main">
+  <p:cSld>
+    <p:spTree>
+      <p:nvGrpSpPr>
+        <p:cNvPr id="1" name=""/>
+        <p:cNvGrpSpPr/>
+        <p:nvPr/>
+      </p:nvGrpSpPr>
+      <p:grpSpPr>
+        <a:xfrm>
+          <a:off x="0" y="0"/>
+          <a:ext cx="0" cy="0"/>
+          <a:chOff x="0" y="0"/>
+          <a:chExt cx="0" cy="0"/>
+        </a:xfrm>
+      </p:grpSpPr>
+      <p:pic>
+        <p:nvPicPr>
+          <p:cNvPr id="2" name="Picture 1">
+            <a:extLst>
+              <a:ext uri="{FF2B5EF4-FFF2-40B4-BE49-F238E27FC236}">
+                <a16:creationId xmlns:a16="http://schemas.microsoft.com/office/drawing/2014/main" id="{C9CC8715-D0B6-4BCB-9F57-E9174DBD79AE}"/>
+              </a:ext>
+            </a:extLst>
+          </p:cNvPr>
+          <p:cNvPicPr>
+            <a:picLocks noChangeAspect="1"/>
+          </p:cNvPicPr>
+          <p:nvPr/>
+        </p:nvPicPr>
+        <p:blipFill>
+          <a:blip r:embed="rId2"/>
+          <a:stretch>
+            <a:fillRect/>
+          </a:stretch>
+        </p:blipFill>
+        <p:spPr>
+          <a:xfrm>
+            <a:off x="0" y="0"/>
+            <a:ext cx="12192000" cy="6858000"/>
+          </a:xfrm>
+          <a:prstGeom prst="rect">
+            <a:avLst/>
+          </a:prstGeom>
+        </p:spPr>
+      </p:pic>
+      <p:pic>
+        <p:nvPicPr>
+          <p:cNvPr id="3" name="Picture 2">
+            <a:extLst>
+              <a:ext uri="{FF2B5EF4-FFF2-40B4-BE49-F238E27FC236}">
+                <a16:creationId xmlns:a16="http://schemas.microsoft.com/office/drawing/2014/main" id="{D53C0AB9-9351-427C-A1F0-FFAA0C210BF3}"/>
+              </a:ext>
+            </a:extLst>
+          </p:cNvPr>
+          <p:cNvPicPr>
+            <a:picLocks noChangeAspect="1"/>
+          </p:cNvPicPr>
+          <p:nvPr/>
+        </p:nvPicPr>
+        <p:blipFill>
+          <a:blip r:embed="rId3">
+            <a:extLst>
+              <a:ext uri="{28A0092B-C50C-407E-A947-70E740481C1C}">
+                <a14:useLocalDpi xmlns:a14="http://schemas.microsoft.com/office/drawing/2010/main" val="0"/>
+              </a:ext>
+            </a:extLst>
+          </a:blip>
+          <a:stretch>
+            <a:fillRect/>
+          </a:stretch>
+        </p:blipFill>
+        <p:spPr>
+          <a:xfrm>
+            <a:off x="357967" y="1788957"/>
+            <a:ext cx="4477500" cy="4731326"/>
+          </a:xfrm>
+          <a:prstGeom prst="rect">
+            <a:avLst/>
+          </a:prstGeom>
+        </p:spPr>
+      </p:pic>
+      <p:pic>
+        <p:nvPicPr>
+          <p:cNvPr id="6" name="Picture 5">
+            <a:extLst>
+              <a:ext uri="{FF2B5EF4-FFF2-40B4-BE49-F238E27FC236}">
+                <a16:creationId xmlns:a16="http://schemas.microsoft.com/office/drawing/2014/main" id="{7323B507-65B1-46AE-9EF3-A7409FEABD9D}"/>
+              </a:ext>
+            </a:extLst>
+          </p:cNvPr>
+          <p:cNvPicPr>
+            <a:picLocks noChangeAspect="1"/>
+          </p:cNvPicPr>
+          <p:nvPr/>
+        </p:nvPicPr>
+        <p:blipFill>
+          <a:blip r:embed="rId4"/>
+          <a:stretch>
+            <a:fillRect/>
+          </a:stretch>
+        </p:blipFill>
+        <p:spPr>
+          <a:xfrm>
+            <a:off x="3137831" y="728210"/>
+            <a:ext cx="9054169" cy="5000064"/>
+          </a:xfrm>
+          <a:prstGeom prst="rect">
+            <a:avLst/>
+          </a:prstGeom>
+        </p:spPr>
+      </p:pic>
+    </p:spTree>
+    <p:extLst>
+      <p:ext uri="{BB962C8B-B14F-4D97-AF65-F5344CB8AC3E}">
+        <p14:creationId xmlns:p14="http://schemas.microsoft.com/office/powerpoint/2010/main" val="484148259"/>
+      </p:ext>
+    </p:extLst>
+  </p:cSld>
+  <p:clrMapOvr>
+    <a:masterClrMapping/>
+  </p:clrMapOvr>
+</p:sld>
+</file>
+
+<file path=ppt/slides/slide8.xml><?xml version="1.0" encoding="utf-8"?>
+<p:sld xmlns:a="http://schemas.openxmlformats.org/drawingml/2006/main" xmlns:r="http://schemas.openxmlformats.org/officeDocument/2006/relationships" xmlns:p="http://schemas.openxmlformats.org/presentationml/2006/main">
+  <p:cSld>
+    <p:spTree>
+      <p:nvGrpSpPr>
+        <p:cNvPr id="1" name=""/>
+        <p:cNvGrpSpPr/>
+        <p:nvPr/>
+      </p:nvGrpSpPr>
+      <p:grpSpPr>
+        <a:xfrm>
+          <a:off x="0" y="0"/>
+          <a:ext cx="0" cy="0"/>
+          <a:chOff x="0" y="0"/>
+          <a:chExt cx="0" cy="0"/>
+        </a:xfrm>
+      </p:grpSpPr>
+      <p:pic>
+        <p:nvPicPr>
+          <p:cNvPr id="2" name="Picture 1">
+            <a:extLst>
+              <a:ext uri="{FF2B5EF4-FFF2-40B4-BE49-F238E27FC236}">
+                <a16:creationId xmlns:a16="http://schemas.microsoft.com/office/drawing/2014/main" id="{C9CC8715-D0B6-4BCB-9F57-E9174DBD79AE}"/>
+              </a:ext>
+            </a:extLst>
+          </p:cNvPr>
+          <p:cNvPicPr>
+            <a:picLocks noChangeAspect="1"/>
+          </p:cNvPicPr>
+          <p:nvPr/>
+        </p:nvPicPr>
+        <p:blipFill>
+          <a:blip r:embed="rId2"/>
+          <a:stretch>
+            <a:fillRect/>
+          </a:stretch>
+        </p:blipFill>
+        <p:spPr>
+          <a:xfrm>
+            <a:off x="0" y="0"/>
+            <a:ext cx="12192000" cy="6858000"/>
+          </a:xfrm>
+          <a:prstGeom prst="rect">
+            <a:avLst/>
+          </a:prstGeom>
+        </p:spPr>
+      </p:pic>
+      <p:pic>
+        <p:nvPicPr>
+          <p:cNvPr id="6" name="Picture 5">
+            <a:extLst>
+              <a:ext uri="{FF2B5EF4-FFF2-40B4-BE49-F238E27FC236}">
+                <a16:creationId xmlns:a16="http://schemas.microsoft.com/office/drawing/2014/main" id="{7323B507-65B1-46AE-9EF3-A7409FEABD9D}"/>
+              </a:ext>
+            </a:extLst>
+          </p:cNvPr>
+          <p:cNvPicPr>
+            <a:picLocks noChangeAspect="1"/>
+          </p:cNvPicPr>
+          <p:nvPr/>
+        </p:nvPicPr>
+        <p:blipFill>
+          <a:blip r:embed="rId3"/>
+          <a:stretch>
+            <a:fillRect/>
+          </a:stretch>
+        </p:blipFill>
+        <p:spPr>
+          <a:xfrm>
+            <a:off x="308806" y="217241"/>
+            <a:ext cx="11883194" cy="6562362"/>
+          </a:xfrm>
+          <a:prstGeom prst="rect">
+            <a:avLst/>
+          </a:prstGeom>
+        </p:spPr>
+      </p:pic>
+      <p:pic>
+        <p:nvPicPr>
+          <p:cNvPr id="3" name="Picture 2">
+            <a:extLst>
+              <a:ext uri="{FF2B5EF4-FFF2-40B4-BE49-F238E27FC236}">
+                <a16:creationId xmlns:a16="http://schemas.microsoft.com/office/drawing/2014/main" id="{D53C0AB9-9351-427C-A1F0-FFAA0C210BF3}"/>
+              </a:ext>
+            </a:extLst>
+          </p:cNvPr>
+          <p:cNvPicPr>
+            <a:picLocks noChangeAspect="1"/>
+          </p:cNvPicPr>
+          <p:nvPr/>
+        </p:nvPicPr>
+        <p:blipFill>
+          <a:blip r:embed="rId4">
+            <a:extLst>
+              <a:ext uri="{28A0092B-C50C-407E-A947-70E740481C1C}">
+                <a14:useLocalDpi xmlns:a14="http://schemas.microsoft.com/office/drawing/2010/main" val="0"/>
+              </a:ext>
+            </a:extLst>
+          </a:blip>
+          <a:stretch>
+            <a:fillRect/>
+          </a:stretch>
+        </p:blipFill>
+        <p:spPr>
+          <a:xfrm flipH="1">
+            <a:off x="8646561" y="3494906"/>
+            <a:ext cx="3028261" cy="3199931"/>
+          </a:xfrm>
+          <a:prstGeom prst="rect">
+            <a:avLst/>
+          </a:prstGeom>
+        </p:spPr>
+      </p:pic>
+    </p:spTree>
+    <p:extLst>
+      <p:ext uri="{BB962C8B-B14F-4D97-AF65-F5344CB8AC3E}">
+        <p14:creationId xmlns:p14="http://schemas.microsoft.com/office/powerpoint/2010/main" val="3820219835"/>
+      </p:ext>
+    </p:extLst>
+  </p:cSld>
+  <p:clrMapOvr>
+    <a:masterClrMapping/>
+  </p:clrMapOvr>
+</p:sld>
+</file>
+
+<file path=ppt/slides/slide9.xml><?xml version="1.0" encoding="utf-8"?>
+<p:sld xmlns:a="http://schemas.openxmlformats.org/drawingml/2006/main" xmlns:r="http://schemas.openxmlformats.org/officeDocument/2006/relationships" xmlns:p="http://schemas.openxmlformats.org/presentationml/2006/main">
+  <p:cSld>
+    <p:spTree>
+      <p:nvGrpSpPr>
+        <p:cNvPr id="1" name=""/>
+        <p:cNvGrpSpPr/>
+        <p:nvPr/>
+      </p:nvGrpSpPr>
+      <p:grpSpPr>
+        <a:xfrm>
+          <a:off x="0" y="0"/>
+          <a:ext cx="0" cy="0"/>
+          <a:chOff x="0" y="0"/>
+          <a:chExt cx="0" cy="0"/>
+        </a:xfrm>
+      </p:grpSpPr>
+      <p:pic>
+        <p:nvPicPr>
+          <p:cNvPr id="2" name="Picture 1">
+            <a:extLst>
+              <a:ext uri="{FF2B5EF4-FFF2-40B4-BE49-F238E27FC236}">
+                <a16:creationId xmlns:a16="http://schemas.microsoft.com/office/drawing/2014/main" id="{C9CC8715-D0B6-4BCB-9F57-E9174DBD79AE}"/>
+              </a:ext>
+            </a:extLst>
+          </p:cNvPr>
+          <p:cNvPicPr>
+            <a:picLocks noChangeAspect="1"/>
+          </p:cNvPicPr>
+          <p:nvPr/>
+        </p:nvPicPr>
+        <p:blipFill>
+          <a:blip r:embed="rId2"/>
+          <a:stretch>
+            <a:fillRect/>
+          </a:stretch>
+        </p:blipFill>
+        <p:spPr>
+          <a:xfrm>
+            <a:off x="-1" y="0"/>
+            <a:ext cx="12192000" cy="6858000"/>
+          </a:xfrm>
+          <a:prstGeom prst="rect">
+            <a:avLst/>
+          </a:prstGeom>
+        </p:spPr>
+      </p:pic>
+      <p:pic>
+        <p:nvPicPr>
+          <p:cNvPr id="3" name="Picture 2">
+            <a:extLst>
+              <a:ext uri="{FF2B5EF4-FFF2-40B4-BE49-F238E27FC236}">
+                <a16:creationId xmlns:a16="http://schemas.microsoft.com/office/drawing/2014/main" id="{D53C0AB9-9351-427C-A1F0-FFAA0C210BF3}"/>
+              </a:ext>
+            </a:extLst>
+          </p:cNvPr>
+          <p:cNvPicPr>
+            <a:picLocks noChangeAspect="1"/>
+          </p:cNvPicPr>
+          <p:nvPr/>
+        </p:nvPicPr>
+        <p:blipFill>
+          <a:blip r:embed="rId3">
+            <a:extLst>
+              <a:ext uri="{28A0092B-C50C-407E-A947-70E740481C1C}">
+                <a14:useLocalDpi xmlns:a14="http://schemas.microsoft.com/office/drawing/2010/main" val="0"/>
+              </a:ext>
+            </a:extLst>
+          </a:blip>
+          <a:stretch>
+            <a:fillRect/>
+          </a:stretch>
+        </p:blipFill>
+        <p:spPr>
+          <a:xfrm flipH="1">
+            <a:off x="9196941" y="3763788"/>
+            <a:ext cx="2844935" cy="3006212"/>
+          </a:xfrm>
+          <a:prstGeom prst="rect">
+            <a:avLst/>
+          </a:prstGeom>
+        </p:spPr>
+      </p:pic>
+      <p:pic>
+        <p:nvPicPr>
+          <p:cNvPr id="6" name="Picture 5">
+            <a:extLst>
+              <a:ext uri="{FF2B5EF4-FFF2-40B4-BE49-F238E27FC236}">
+                <a16:creationId xmlns:a16="http://schemas.microsoft.com/office/drawing/2014/main" id="{7323B507-65B1-46AE-9EF3-A7409FEABD9D}"/>
+              </a:ext>
+            </a:extLst>
+          </p:cNvPr>
+          <p:cNvPicPr>
+            <a:picLocks noChangeAspect="1"/>
+          </p:cNvPicPr>
+          <p:nvPr/>
+        </p:nvPicPr>
+        <p:blipFill>
+          <a:blip r:embed="rId4"/>
+          <a:stretch>
+            <a:fillRect/>
+          </a:stretch>
+        </p:blipFill>
+        <p:spPr>
+          <a:xfrm>
+            <a:off x="3608257" y="178425"/>
+            <a:ext cx="4975483" cy="2747655"/>
+          </a:xfrm>
+          <a:prstGeom prst="rect">
+            <a:avLst/>
+          </a:prstGeom>
+        </p:spPr>
+      </p:pic>
+      <p:sp>
+        <p:nvSpPr>
+          <p:cNvPr id="4" name="TextBox 3">
+            <a:extLst>
+              <a:ext uri="{FF2B5EF4-FFF2-40B4-BE49-F238E27FC236}">
+                <a16:creationId xmlns:a16="http://schemas.microsoft.com/office/drawing/2014/main" id="{B28DD75E-2A17-4140-BE31-0EA279E602FC}"/>
+              </a:ext>
+            </a:extLst>
+          </p:cNvPr>
+          <p:cNvSpPr txBox="1"/>
+          <p:nvPr/>
+        </p:nvSpPr>
+        <p:spPr>
+          <a:xfrm>
+            <a:off x="412954" y="2926080"/>
+            <a:ext cx="6359505" cy="2215991"/>
+          </a:xfrm>
+          <a:prstGeom prst="rect">
+            <a:avLst/>
+          </a:prstGeom>
+          <a:noFill/>
+        </p:spPr>
+        <p:txBody>
+          <a:bodyPr wrap="square" rtlCol="0">
+            <a:spAutoFit/>
+          </a:bodyPr>
+          <a:lstStyle/>
+          <a:p>
+            <a:r>
+              <a:rPr lang="en-US" sz="3200" dirty="0">
+                <a:solidFill>
+                  <a:schemeClr val="bg2"/>
+                </a:solidFill>
+              </a:rPr>
+              <a:t>This week:</a:t>
+            </a:r>
+            <a:br>
+              <a:rPr lang="en-US" dirty="0">
+                <a:solidFill>
+                  <a:schemeClr val="bg2"/>
+                </a:solidFill>
+              </a:rPr>
+            </a:br>
+            <a:br>
+              <a:rPr lang="en-US" dirty="0">
+                <a:solidFill>
+                  <a:schemeClr val="bg2"/>
+                </a:solidFill>
+              </a:rPr>
+            </a:br>
+            <a:r>
+              <a:rPr lang="en-US" sz="4400" b="1" dirty="0">
+                <a:solidFill>
+                  <a:schemeClr val="bg2"/>
+                </a:solidFill>
+              </a:rPr>
+              <a:t>.NET open-source projects </a:t>
+            </a:r>
+          </a:p>
+          <a:p>
+            <a:r>
+              <a:rPr lang="en-US" sz="4400" dirty="0">
+                <a:solidFill>
+                  <a:schemeClr val="bg2"/>
+                </a:solidFill>
+              </a:rPr>
+              <a:t>with</a:t>
+            </a:r>
+            <a:r>
+              <a:rPr lang="en-US" sz="4400" b="1" dirty="0">
+                <a:solidFill>
+                  <a:schemeClr val="bg2"/>
+                </a:solidFill>
+              </a:rPr>
+              <a:t> Isaac Levin </a:t>
+            </a:r>
+            <a:endParaRPr lang="en-US" b="1" dirty="0">
+              <a:solidFill>
+                <a:schemeClr val="bg2"/>
+              </a:solidFill>
+            </a:endParaRPr>
+          </a:p>
+        </p:txBody>
+      </p:sp>
+      <p:sp>
+        <p:nvSpPr>
+          <p:cNvPr id="5" name="TextBox 4">
+            <a:extLst>
+              <a:ext uri="{FF2B5EF4-FFF2-40B4-BE49-F238E27FC236}">
+                <a16:creationId xmlns:a16="http://schemas.microsoft.com/office/drawing/2014/main" id="{0B382353-7470-4A32-B921-9E9C3C2F6BEE}"/>
+              </a:ext>
+            </a:extLst>
+          </p:cNvPr>
+          <p:cNvSpPr txBox="1"/>
+          <p:nvPr/>
+        </p:nvSpPr>
+        <p:spPr>
+          <a:xfrm>
+            <a:off x="412954" y="5767201"/>
+            <a:ext cx="9615949" cy="769441"/>
+          </a:xfrm>
+          <a:prstGeom prst="rect">
+            <a:avLst/>
+          </a:prstGeom>
+          <a:noFill/>
+        </p:spPr>
+        <p:txBody>
+          <a:bodyPr wrap="square" rtlCol="0">
+            <a:spAutoFit/>
+          </a:bodyPr>
+          <a:lstStyle/>
+          <a:p>
+            <a:r>
+              <a:rPr lang="en-US" sz="4400" b="1" dirty="0">
+                <a:solidFill>
+                  <a:schemeClr val="bg2"/>
+                </a:solidFill>
+              </a:rPr>
+              <a:t>Monday</a:t>
+            </a:r>
+            <a:r>
+              <a:rPr lang="en-US" sz="4400" dirty="0">
+                <a:solidFill>
+                  <a:schemeClr val="bg2"/>
+                </a:solidFill>
+              </a:rPr>
+              <a:t> | 11 AM US/Central (16:00 UTC)</a:t>
+            </a:r>
+            <a:endParaRPr lang="en-US" dirty="0">
+              <a:solidFill>
+                <a:schemeClr val="bg2"/>
+              </a:solidFill>
+            </a:endParaRPr>
+          </a:p>
+        </p:txBody>
+      </p:sp>
+      <p:pic>
+        <p:nvPicPr>
+          <p:cNvPr id="1028" name="Picture 4" descr="Image">
+            <a:extLst>
+              <a:ext uri="{FF2B5EF4-FFF2-40B4-BE49-F238E27FC236}">
+                <a16:creationId xmlns:a16="http://schemas.microsoft.com/office/drawing/2014/main" id="{684443C6-40D8-4CBB-9A63-102612CC817A}"/>
+              </a:ext>
+            </a:extLst>
+          </p:cNvPr>
+          <p:cNvPicPr>
+            <a:picLocks noChangeAspect="1" noChangeArrowheads="1"/>
+          </p:cNvPicPr>
+          <p:nvPr/>
+        </p:nvPicPr>
+        <p:blipFill>
+          <a:blip r:embed="rId5">
+            <a:extLst>
+              <a:ext uri="{28A0092B-C50C-407E-A947-70E740481C1C}">
+                <a14:useLocalDpi xmlns:a14="http://schemas.microsoft.com/office/drawing/2010/main" val="0"/>
+              </a:ext>
+            </a:extLst>
+          </a:blip>
+          <a:srcRect/>
+          <a:stretch>
+            <a:fillRect/>
+          </a:stretch>
+        </p:blipFill>
+        <p:spPr bwMode="auto">
+          <a:xfrm>
+            <a:off x="6928217" y="3429000"/>
+            <a:ext cx="1786497" cy="1786497"/>
+          </a:xfrm>
+          <a:prstGeom prst="ellipse">
+            <a:avLst/>
+          </a:prstGeom>
+          <a:ln w="63500" cap="rnd">
+            <a:solidFill>
+              <a:srgbClr val="333333"/>
+            </a:solidFill>
+          </a:ln>
+          <a:effectLst>
+            <a:outerShdw blurRad="381000" dist="292100" dir="5400000" sx="-80000" sy="-18000" rotWithShape="0">
+              <a:srgbClr val="000000">
+                <a:alpha val="22000"/>
+              </a:srgbClr>
+            </a:outerShdw>
+          </a:effectLst>
+          <a:scene3d>
+            <a:camera prst="orthographicFront"/>
+            <a:lightRig rig="contrasting" dir="t">
+              <a:rot lat="0" lon="0" rev="3000000"/>
+            </a:lightRig>
+          </a:scene3d>
+          <a:sp3d contourW="7620">
+            <a:bevelT w="95250" h="31750"/>
+            <a:contourClr>
+              <a:srgbClr val="333333"/>
+            </a:contourClr>
+          </a:sp3d>
+          <a:extLst>
+            <a:ext uri="{909E8E84-426E-40DD-AFC4-6F175D3DCCD1}">
+              <a14:hiddenFill xmlns:a14="http://schemas.microsoft.com/office/drawing/2010/main">
+                <a:solidFill>
+                  <a:srgbClr val="FFFFFF"/>
+                </a:solidFill>
+              </a14:hiddenFill>
+            </a:ext>
+          </a:extLst>
+        </p:spPr>
+      </p:pic>
+    </p:spTree>
+    <p:extLst>
+      <p:ext uri="{BB962C8B-B14F-4D97-AF65-F5344CB8AC3E}">
+        <p14:creationId xmlns:p14="http://schemas.microsoft.com/office/powerpoint/2010/main" val="3020206515"/>
       </p:ext>
     </p:extLst>
   </p:cSld>

</xml_diff>

<commit_message>
more changes for cutover to new channels
</commit_message>
<xml_diff>
--- a/media/bumpers/Bumpers.pptx
+++ b/media/bumpers/Bumpers.pptx
@@ -3479,7 +3479,7 @@
                   </a:outerShdw>
                 </a:effectLst>
               </a:rPr>
-              <a:t>Starting at 11:00 AM US/Central (16:00 UTC)!</a:t>
+              <a:t>Starting at 9 AM US/Pacific (16:00 UTC)!</a:t>
             </a:r>
           </a:p>
         </p:txBody>
@@ -3772,7 +3772,7 @@
                   <a:schemeClr val="bg2"/>
                 </a:solidFill>
               </a:rPr>
-              <a:t> | 11 AM US/Central (16:00 UTC)</a:t>
+              <a:t> | 9 AM US/Pacific (16:00 UTC)</a:t>
             </a:r>
             <a:endParaRPr lang="en-US" dirty="0">
               <a:solidFill>
@@ -4006,7 +4006,47 @@
                   </a:outerShdw>
                 </a:effectLst>
               </a:rPr>
-              <a:t>Mondays at 11:00 AM US/Central (16:00 UTC)</a:t>
+              <a:t>Mondays </a:t>
+            </a:r>
+            <a:r>
+              <a:rPr lang="en-US" sz="4000" b="1">
+                <a:ln w="19050">
+                  <a:solidFill>
+                    <a:schemeClr val="tx1"/>
+                  </a:solidFill>
+                </a:ln>
+                <a:solidFill>
+                  <a:schemeClr val="bg1"/>
+                </a:solidFill>
+                <a:effectLst>
+                  <a:outerShdw blurRad="38100" dist="19050" dir="2700000" algn="tl" rotWithShape="0">
+                    <a:schemeClr val="dk1">
+                      <a:alpha val="40000"/>
+                    </a:schemeClr>
+                  </a:outerShdw>
+                </a:effectLst>
+              </a:rPr>
+              <a:t>at 9 </a:t>
+            </a:r>
+            <a:r>
+              <a:rPr lang="en-US" sz="4000" b="1" dirty="0">
+                <a:ln w="19050">
+                  <a:solidFill>
+                    <a:schemeClr val="tx1"/>
+                  </a:solidFill>
+                </a:ln>
+                <a:solidFill>
+                  <a:schemeClr val="bg1"/>
+                </a:solidFill>
+                <a:effectLst>
+                  <a:outerShdw blurRad="38100" dist="19050" dir="2700000" algn="tl" rotWithShape="0">
+                    <a:schemeClr val="dk1">
+                      <a:alpha val="40000"/>
+                    </a:schemeClr>
+                  </a:outerShdw>
+                </a:effectLst>
+              </a:rPr>
+              <a:t>AM US/Pacific (16:00 UTC)</a:t>
             </a:r>
           </a:p>
           <a:p>
@@ -5174,7 +5214,7 @@
                   <a:schemeClr val="bg2"/>
                 </a:solidFill>
               </a:rPr>
-              <a:t> | 11 AM US/Central (16:00 UTC)</a:t>
+              <a:t> | 9 AM US/Pacific (16:00 UTC)</a:t>
             </a:r>
             <a:endParaRPr lang="en-US" dirty="0">
               <a:solidFill>

</xml_diff>

<commit_message>
committing before system reset
</commit_message>
<xml_diff>
--- a/media/bumpers/Bumpers.pptx
+++ b/media/bumpers/Bumpers.pptx
@@ -14,6 +14,8 @@
     <p:sldId id="263" r:id="rId8"/>
     <p:sldId id="264" r:id="rId9"/>
     <p:sldId id="265" r:id="rId10"/>
+    <p:sldId id="267" r:id="rId11"/>
+    <p:sldId id="266" r:id="rId12"/>
   </p:sldIdLst>
   <p:sldSz cx="12192000" cy="6858000"/>
   <p:notesSz cx="6858000" cy="9144000"/>
@@ -278,7 +280,7 @@
           <a:p>
             <a:fld id="{5B9A50E9-7867-4611-83A7-BE32F136494E}" type="datetimeFigureOut">
               <a:rPr lang="en-US" smtClean="0"/>
-              <a:t>8/28/2020</a:t>
+              <a:t>9/27/2021</a:t>
             </a:fld>
             <a:endParaRPr lang="en-US"/>
           </a:p>
@@ -476,7 +478,7 @@
           <a:p>
             <a:fld id="{5B9A50E9-7867-4611-83A7-BE32F136494E}" type="datetimeFigureOut">
               <a:rPr lang="en-US" smtClean="0"/>
-              <a:t>8/28/2020</a:t>
+              <a:t>9/27/2021</a:t>
             </a:fld>
             <a:endParaRPr lang="en-US"/>
           </a:p>
@@ -684,7 +686,7 @@
           <a:p>
             <a:fld id="{5B9A50E9-7867-4611-83A7-BE32F136494E}" type="datetimeFigureOut">
               <a:rPr lang="en-US" smtClean="0"/>
-              <a:t>8/28/2020</a:t>
+              <a:t>9/27/2021</a:t>
             </a:fld>
             <a:endParaRPr lang="en-US"/>
           </a:p>
@@ -882,7 +884,7 @@
           <a:p>
             <a:fld id="{5B9A50E9-7867-4611-83A7-BE32F136494E}" type="datetimeFigureOut">
               <a:rPr lang="en-US" smtClean="0"/>
-              <a:t>8/28/2020</a:t>
+              <a:t>9/27/2021</a:t>
             </a:fld>
             <a:endParaRPr lang="en-US"/>
           </a:p>
@@ -1157,7 +1159,7 @@
           <a:p>
             <a:fld id="{5B9A50E9-7867-4611-83A7-BE32F136494E}" type="datetimeFigureOut">
               <a:rPr lang="en-US" smtClean="0"/>
-              <a:t>8/28/2020</a:t>
+              <a:t>9/27/2021</a:t>
             </a:fld>
             <a:endParaRPr lang="en-US"/>
           </a:p>
@@ -1422,7 +1424,7 @@
           <a:p>
             <a:fld id="{5B9A50E9-7867-4611-83A7-BE32F136494E}" type="datetimeFigureOut">
               <a:rPr lang="en-US" smtClean="0"/>
-              <a:t>8/28/2020</a:t>
+              <a:t>9/27/2021</a:t>
             </a:fld>
             <a:endParaRPr lang="en-US"/>
           </a:p>
@@ -1834,7 +1836,7 @@
           <a:p>
             <a:fld id="{5B9A50E9-7867-4611-83A7-BE32F136494E}" type="datetimeFigureOut">
               <a:rPr lang="en-US" smtClean="0"/>
-              <a:t>8/28/2020</a:t>
+              <a:t>9/27/2021</a:t>
             </a:fld>
             <a:endParaRPr lang="en-US"/>
           </a:p>
@@ -1975,7 +1977,7 @@
           <a:p>
             <a:fld id="{5B9A50E9-7867-4611-83A7-BE32F136494E}" type="datetimeFigureOut">
               <a:rPr lang="en-US" smtClean="0"/>
-              <a:t>8/28/2020</a:t>
+              <a:t>9/27/2021</a:t>
             </a:fld>
             <a:endParaRPr lang="en-US"/>
           </a:p>
@@ -2088,7 +2090,7 @@
           <a:p>
             <a:fld id="{5B9A50E9-7867-4611-83A7-BE32F136494E}" type="datetimeFigureOut">
               <a:rPr lang="en-US" smtClean="0"/>
-              <a:t>8/28/2020</a:t>
+              <a:t>9/27/2021</a:t>
             </a:fld>
             <a:endParaRPr lang="en-US"/>
           </a:p>
@@ -2399,7 +2401,7 @@
           <a:p>
             <a:fld id="{5B9A50E9-7867-4611-83A7-BE32F136494E}" type="datetimeFigureOut">
               <a:rPr lang="en-US" smtClean="0"/>
-              <a:t>8/28/2020</a:t>
+              <a:t>9/27/2021</a:t>
             </a:fld>
             <a:endParaRPr lang="en-US"/>
           </a:p>
@@ -2687,7 +2689,7 @@
           <a:p>
             <a:fld id="{5B9A50E9-7867-4611-83A7-BE32F136494E}" type="datetimeFigureOut">
               <a:rPr lang="en-US" smtClean="0"/>
-              <a:t>8/28/2020</a:t>
+              <a:t>9/27/2021</a:t>
             </a:fld>
             <a:endParaRPr lang="en-US"/>
           </a:p>
@@ -2934,7 +2936,7 @@
           <a:p>
             <a:fld id="{5B9A50E9-7867-4611-83A7-BE32F136494E}" type="datetimeFigureOut">
               <a:rPr lang="en-US" smtClean="0"/>
-              <a:t>8/28/2020</a:t>
+              <a:t>9/27/2021</a:t>
             </a:fld>
             <a:endParaRPr lang="en-US"/>
           </a:p>
@@ -3520,6 +3522,535 @@
 </p:sld>
 </file>
 
+<file path=ppt/slides/slide10.xml><?xml version="1.0" encoding="utf-8"?>
+<p:sld xmlns:a="http://schemas.openxmlformats.org/drawingml/2006/main" xmlns:r="http://schemas.openxmlformats.org/officeDocument/2006/relationships" xmlns:p="http://schemas.openxmlformats.org/presentationml/2006/main">
+  <p:cSld>
+    <p:spTree>
+      <p:nvGrpSpPr>
+        <p:cNvPr id="1" name=""/>
+        <p:cNvGrpSpPr/>
+        <p:nvPr/>
+      </p:nvGrpSpPr>
+      <p:grpSpPr>
+        <a:xfrm>
+          <a:off x="0" y="0"/>
+          <a:ext cx="0" cy="0"/>
+          <a:chOff x="0" y="0"/>
+          <a:chExt cx="0" cy="0"/>
+        </a:xfrm>
+      </p:grpSpPr>
+      <p:pic>
+        <p:nvPicPr>
+          <p:cNvPr id="2" name="Picture 1">
+            <a:extLst>
+              <a:ext uri="{FF2B5EF4-FFF2-40B4-BE49-F238E27FC236}">
+                <a16:creationId xmlns:a16="http://schemas.microsoft.com/office/drawing/2014/main" id="{C9CC8715-D0B6-4BCB-9F57-E9174DBD79AE}"/>
+              </a:ext>
+            </a:extLst>
+          </p:cNvPr>
+          <p:cNvPicPr>
+            <a:picLocks noChangeAspect="1"/>
+          </p:cNvPicPr>
+          <p:nvPr/>
+        </p:nvPicPr>
+        <p:blipFill>
+          <a:blip r:embed="rId2"/>
+          <a:stretch>
+            <a:fillRect/>
+          </a:stretch>
+        </p:blipFill>
+        <p:spPr>
+          <a:xfrm>
+            <a:off x="-1" y="0"/>
+            <a:ext cx="12192000" cy="6858000"/>
+          </a:xfrm>
+          <a:prstGeom prst="rect">
+            <a:avLst/>
+          </a:prstGeom>
+        </p:spPr>
+      </p:pic>
+      <p:pic>
+        <p:nvPicPr>
+          <p:cNvPr id="3" name="Picture 2">
+            <a:extLst>
+              <a:ext uri="{FF2B5EF4-FFF2-40B4-BE49-F238E27FC236}">
+                <a16:creationId xmlns:a16="http://schemas.microsoft.com/office/drawing/2014/main" id="{D53C0AB9-9351-427C-A1F0-FFAA0C210BF3}"/>
+              </a:ext>
+            </a:extLst>
+          </p:cNvPr>
+          <p:cNvPicPr>
+            <a:picLocks noChangeAspect="1"/>
+          </p:cNvPicPr>
+          <p:nvPr/>
+        </p:nvPicPr>
+        <p:blipFill>
+          <a:blip r:embed="rId3">
+            <a:extLst>
+              <a:ext uri="{28A0092B-C50C-407E-A947-70E740481C1C}">
+                <a14:useLocalDpi xmlns:a14="http://schemas.microsoft.com/office/drawing/2010/main" val="0"/>
+              </a:ext>
+            </a:extLst>
+          </a:blip>
+          <a:stretch>
+            <a:fillRect/>
+          </a:stretch>
+        </p:blipFill>
+        <p:spPr>
+          <a:xfrm flipH="1">
+            <a:off x="9196941" y="3763788"/>
+            <a:ext cx="2844935" cy="3006212"/>
+          </a:xfrm>
+          <a:prstGeom prst="rect">
+            <a:avLst/>
+          </a:prstGeom>
+        </p:spPr>
+      </p:pic>
+      <p:pic>
+        <p:nvPicPr>
+          <p:cNvPr id="6" name="Picture 5">
+            <a:extLst>
+              <a:ext uri="{FF2B5EF4-FFF2-40B4-BE49-F238E27FC236}">
+                <a16:creationId xmlns:a16="http://schemas.microsoft.com/office/drawing/2014/main" id="{7323B507-65B1-46AE-9EF3-A7409FEABD9D}"/>
+              </a:ext>
+            </a:extLst>
+          </p:cNvPr>
+          <p:cNvPicPr>
+            <a:picLocks noChangeAspect="1"/>
+          </p:cNvPicPr>
+          <p:nvPr/>
+        </p:nvPicPr>
+        <p:blipFill>
+          <a:blip r:embed="rId4"/>
+          <a:stretch>
+            <a:fillRect/>
+          </a:stretch>
+        </p:blipFill>
+        <p:spPr>
+          <a:xfrm>
+            <a:off x="3608257" y="178425"/>
+            <a:ext cx="4975483" cy="2747655"/>
+          </a:xfrm>
+          <a:prstGeom prst="rect">
+            <a:avLst/>
+          </a:prstGeom>
+        </p:spPr>
+      </p:pic>
+      <p:sp>
+        <p:nvSpPr>
+          <p:cNvPr id="4" name="TextBox 3">
+            <a:extLst>
+              <a:ext uri="{FF2B5EF4-FFF2-40B4-BE49-F238E27FC236}">
+                <a16:creationId xmlns:a16="http://schemas.microsoft.com/office/drawing/2014/main" id="{B28DD75E-2A17-4140-BE31-0EA279E602FC}"/>
+              </a:ext>
+            </a:extLst>
+          </p:cNvPr>
+          <p:cNvSpPr txBox="1"/>
+          <p:nvPr/>
+        </p:nvSpPr>
+        <p:spPr>
+          <a:xfrm>
+            <a:off x="412953" y="2825409"/>
+            <a:ext cx="8170787" cy="2708434"/>
+          </a:xfrm>
+          <a:prstGeom prst="rect">
+            <a:avLst/>
+          </a:prstGeom>
+          <a:noFill/>
+        </p:spPr>
+        <p:txBody>
+          <a:bodyPr wrap="square" rtlCol="0">
+            <a:spAutoFit/>
+          </a:bodyPr>
+          <a:lstStyle/>
+          <a:p>
+            <a:r>
+              <a:rPr lang="en-US" sz="3200" dirty="0">
+                <a:solidFill>
+                  <a:schemeClr val="bg2"/>
+                </a:solidFill>
+              </a:rPr>
+              <a:t>✨ Special Episode! ✨</a:t>
+            </a:r>
+            <a:br>
+              <a:rPr lang="en-US" dirty="0">
+                <a:solidFill>
+                  <a:schemeClr val="bg2"/>
+                </a:solidFill>
+              </a:rPr>
+            </a:br>
+            <a:br>
+              <a:rPr lang="en-US" dirty="0">
+                <a:solidFill>
+                  <a:schemeClr val="bg2"/>
+                </a:solidFill>
+              </a:rPr>
+            </a:br>
+            <a:r>
+              <a:rPr lang="en-US" sz="4000" b="1" dirty="0">
+                <a:solidFill>
+                  <a:srgbClr val="F8F9FA"/>
+                </a:solidFill>
+                <a:latin typeface="SFMono-Regular"/>
+              </a:rPr>
+              <a:t>.NET IoT </a:t>
+            </a:r>
+            <a:r>
+              <a:rPr lang="en-US" sz="4000" b="1" i="0" dirty="0">
+                <a:solidFill>
+                  <a:srgbClr val="F8F9FA"/>
+                </a:solidFill>
+                <a:effectLst/>
+                <a:latin typeface="SFMono-Regular"/>
+              </a:rPr>
+              <a:t>Ask Me Anything</a:t>
+            </a:r>
+          </a:p>
+          <a:p>
+            <a:r>
+              <a:rPr lang="en-US" sz="3200" dirty="0">
+                <a:solidFill>
+                  <a:schemeClr val="bg2"/>
+                </a:solidFill>
+              </a:rPr>
+              <a:t>with</a:t>
+            </a:r>
+            <a:r>
+              <a:rPr lang="en-US" sz="3200" b="1" dirty="0">
+                <a:solidFill>
+                  <a:schemeClr val="bg2"/>
+                </a:solidFill>
+              </a:rPr>
+              <a:t> </a:t>
+            </a:r>
+            <a:r>
+              <a:rPr lang="en-US" sz="4000" b="1" dirty="0">
+                <a:solidFill>
+                  <a:schemeClr val="bg2"/>
+                </a:solidFill>
+              </a:rPr>
+              <a:t>Laurent </a:t>
+            </a:r>
+            <a:r>
+              <a:rPr lang="en-US" sz="4000" b="1" dirty="0" err="1">
+                <a:solidFill>
+                  <a:schemeClr val="bg2"/>
+                </a:solidFill>
+              </a:rPr>
+              <a:t>Ellerbach</a:t>
+            </a:r>
+            <a:r>
+              <a:rPr lang="en-US" sz="4000" b="1" dirty="0">
+                <a:solidFill>
+                  <a:schemeClr val="bg2"/>
+                </a:solidFill>
+              </a:rPr>
+              <a:t>, </a:t>
+            </a:r>
+            <a:r>
+              <a:rPr lang="en-US" sz="4000" b="1" i="0" dirty="0">
+                <a:solidFill>
+                  <a:srgbClr val="F8F9FA"/>
+                </a:solidFill>
+                <a:effectLst/>
+                <a:latin typeface="SFMono-Regular"/>
+              </a:rPr>
+              <a:t>Krzysztof </a:t>
+            </a:r>
+            <a:r>
+              <a:rPr lang="en-US" sz="4000" b="1" i="0" dirty="0" err="1">
+                <a:solidFill>
+                  <a:srgbClr val="F8F9FA"/>
+                </a:solidFill>
+                <a:effectLst/>
+                <a:latin typeface="SFMono-Regular"/>
+              </a:rPr>
+              <a:t>Wicher</a:t>
+            </a:r>
+            <a:r>
+              <a:rPr lang="en-US" sz="4000" b="1" dirty="0">
+                <a:solidFill>
+                  <a:schemeClr val="bg2"/>
+                </a:solidFill>
+              </a:rPr>
+              <a:t>, </a:t>
+            </a:r>
+            <a:r>
+              <a:rPr lang="en-US" sz="3200" dirty="0">
+                <a:solidFill>
+                  <a:schemeClr val="bg2"/>
+                </a:solidFill>
+              </a:rPr>
+              <a:t>and</a:t>
+            </a:r>
+            <a:r>
+              <a:rPr lang="en-US" sz="4000" b="1" dirty="0">
+                <a:solidFill>
+                  <a:schemeClr val="bg2"/>
+                </a:solidFill>
+              </a:rPr>
+              <a:t> </a:t>
+            </a:r>
+            <a:r>
+              <a:rPr lang="en-US" sz="4000" b="1" i="0" dirty="0">
+                <a:solidFill>
+                  <a:srgbClr val="F8F9FA"/>
+                </a:solidFill>
+                <a:effectLst/>
+                <a:latin typeface="SFMono-Regular"/>
+              </a:rPr>
+              <a:t>Jose Perez Rodriguez</a:t>
+            </a:r>
+            <a:endParaRPr lang="en-US" b="1" dirty="0">
+              <a:solidFill>
+                <a:schemeClr val="bg2"/>
+              </a:solidFill>
+            </a:endParaRPr>
+          </a:p>
+        </p:txBody>
+      </p:sp>
+      <p:sp>
+        <p:nvSpPr>
+          <p:cNvPr id="5" name="TextBox 4">
+            <a:extLst>
+              <a:ext uri="{FF2B5EF4-FFF2-40B4-BE49-F238E27FC236}">
+                <a16:creationId xmlns:a16="http://schemas.microsoft.com/office/drawing/2014/main" id="{0B382353-7470-4A32-B921-9E9C3C2F6BEE}"/>
+              </a:ext>
+            </a:extLst>
+          </p:cNvPr>
+          <p:cNvSpPr txBox="1"/>
+          <p:nvPr/>
+        </p:nvSpPr>
+        <p:spPr>
+          <a:xfrm>
+            <a:off x="412954" y="5767201"/>
+            <a:ext cx="9615949" cy="769441"/>
+          </a:xfrm>
+          <a:prstGeom prst="rect">
+            <a:avLst/>
+          </a:prstGeom>
+          <a:noFill/>
+        </p:spPr>
+        <p:txBody>
+          <a:bodyPr wrap="square" rtlCol="0">
+            <a:spAutoFit/>
+          </a:bodyPr>
+          <a:lstStyle/>
+          <a:p>
+            <a:r>
+              <a:rPr lang="en-US" sz="4400" b="1" dirty="0">
+                <a:solidFill>
+                  <a:schemeClr val="bg2"/>
+                </a:solidFill>
+              </a:rPr>
+              <a:t>Monday</a:t>
+            </a:r>
+            <a:r>
+              <a:rPr lang="en-US" sz="4400" dirty="0">
+                <a:solidFill>
+                  <a:schemeClr val="bg2"/>
+                </a:solidFill>
+              </a:rPr>
+              <a:t> | 9 AM US/Pacific (16:00 UTC)</a:t>
+            </a:r>
+            <a:endParaRPr lang="en-US" dirty="0">
+              <a:solidFill>
+                <a:schemeClr val="bg2"/>
+              </a:solidFill>
+            </a:endParaRPr>
+          </a:p>
+        </p:txBody>
+      </p:sp>
+    </p:spTree>
+    <p:extLst>
+      <p:ext uri="{BB962C8B-B14F-4D97-AF65-F5344CB8AC3E}">
+        <p14:creationId xmlns:p14="http://schemas.microsoft.com/office/powerpoint/2010/main" val="2530328212"/>
+      </p:ext>
+    </p:extLst>
+  </p:cSld>
+  <p:clrMapOvr>
+    <a:masterClrMapping/>
+  </p:clrMapOvr>
+</p:sld>
+</file>
+
+<file path=ppt/slides/slide11.xml><?xml version="1.0" encoding="utf-8"?>
+<p:sld xmlns:a="http://schemas.openxmlformats.org/drawingml/2006/main" xmlns:r="http://schemas.openxmlformats.org/officeDocument/2006/relationships" xmlns:p="http://schemas.openxmlformats.org/presentationml/2006/main">
+  <p:cSld>
+    <p:spTree>
+      <p:nvGrpSpPr>
+        <p:cNvPr id="1" name=""/>
+        <p:cNvGrpSpPr/>
+        <p:nvPr/>
+      </p:nvGrpSpPr>
+      <p:grpSpPr>
+        <a:xfrm>
+          <a:off x="0" y="0"/>
+          <a:ext cx="0" cy="0"/>
+          <a:chOff x="0" y="0"/>
+          <a:chExt cx="0" cy="0"/>
+        </a:xfrm>
+      </p:grpSpPr>
+      <p:pic>
+        <p:nvPicPr>
+          <p:cNvPr id="2" name="Picture 1">
+            <a:extLst>
+              <a:ext uri="{FF2B5EF4-FFF2-40B4-BE49-F238E27FC236}">
+                <a16:creationId xmlns:a16="http://schemas.microsoft.com/office/drawing/2014/main" id="{C9CC8715-D0B6-4BCB-9F57-E9174DBD79AE}"/>
+              </a:ext>
+            </a:extLst>
+          </p:cNvPr>
+          <p:cNvPicPr>
+            <a:picLocks noChangeAspect="1"/>
+          </p:cNvPicPr>
+          <p:nvPr/>
+        </p:nvPicPr>
+        <p:blipFill>
+          <a:blip r:embed="rId2"/>
+          <a:stretch>
+            <a:fillRect/>
+          </a:stretch>
+        </p:blipFill>
+        <p:spPr>
+          <a:xfrm>
+            <a:off x="-1" y="0"/>
+            <a:ext cx="12192000" cy="6858000"/>
+          </a:xfrm>
+          <a:prstGeom prst="rect">
+            <a:avLst/>
+          </a:prstGeom>
+        </p:spPr>
+      </p:pic>
+      <p:pic>
+        <p:nvPicPr>
+          <p:cNvPr id="3" name="Picture 2">
+            <a:extLst>
+              <a:ext uri="{FF2B5EF4-FFF2-40B4-BE49-F238E27FC236}">
+                <a16:creationId xmlns:a16="http://schemas.microsoft.com/office/drawing/2014/main" id="{D53C0AB9-9351-427C-A1F0-FFAA0C210BF3}"/>
+              </a:ext>
+            </a:extLst>
+          </p:cNvPr>
+          <p:cNvPicPr>
+            <a:picLocks noChangeAspect="1"/>
+          </p:cNvPicPr>
+          <p:nvPr/>
+        </p:nvPicPr>
+        <p:blipFill>
+          <a:blip r:embed="rId3">
+            <a:extLst>
+              <a:ext uri="{28A0092B-C50C-407E-A947-70E740481C1C}">
+                <a14:useLocalDpi xmlns:a14="http://schemas.microsoft.com/office/drawing/2010/main" val="0"/>
+              </a:ext>
+            </a:extLst>
+          </a:blip>
+          <a:stretch>
+            <a:fillRect/>
+          </a:stretch>
+        </p:blipFill>
+        <p:spPr>
+          <a:xfrm flipH="1">
+            <a:off x="9196941" y="3763788"/>
+            <a:ext cx="2844935" cy="3006212"/>
+          </a:xfrm>
+          <a:prstGeom prst="rect">
+            <a:avLst/>
+          </a:prstGeom>
+        </p:spPr>
+      </p:pic>
+      <p:pic>
+        <p:nvPicPr>
+          <p:cNvPr id="6" name="Picture 5">
+            <a:extLst>
+              <a:ext uri="{FF2B5EF4-FFF2-40B4-BE49-F238E27FC236}">
+                <a16:creationId xmlns:a16="http://schemas.microsoft.com/office/drawing/2014/main" id="{7323B507-65B1-46AE-9EF3-A7409FEABD9D}"/>
+              </a:ext>
+            </a:extLst>
+          </p:cNvPr>
+          <p:cNvPicPr>
+            <a:picLocks noChangeAspect="1"/>
+          </p:cNvPicPr>
+          <p:nvPr/>
+        </p:nvPicPr>
+        <p:blipFill>
+          <a:blip r:embed="rId4"/>
+          <a:stretch>
+            <a:fillRect/>
+          </a:stretch>
+        </p:blipFill>
+        <p:spPr>
+          <a:xfrm>
+            <a:off x="3608257" y="178425"/>
+            <a:ext cx="4975483" cy="2747655"/>
+          </a:xfrm>
+          <a:prstGeom prst="rect">
+            <a:avLst/>
+          </a:prstGeom>
+        </p:spPr>
+      </p:pic>
+      <p:sp>
+        <p:nvSpPr>
+          <p:cNvPr id="5" name="TextBox 4">
+            <a:extLst>
+              <a:ext uri="{FF2B5EF4-FFF2-40B4-BE49-F238E27FC236}">
+                <a16:creationId xmlns:a16="http://schemas.microsoft.com/office/drawing/2014/main" id="{0B382353-7470-4A32-B921-9E9C3C2F6BEE}"/>
+              </a:ext>
+            </a:extLst>
+          </p:cNvPr>
+          <p:cNvSpPr txBox="1"/>
+          <p:nvPr/>
+        </p:nvSpPr>
+        <p:spPr>
+          <a:xfrm>
+            <a:off x="412954" y="5767201"/>
+            <a:ext cx="9615949" cy="769441"/>
+          </a:xfrm>
+          <a:prstGeom prst="rect">
+            <a:avLst/>
+          </a:prstGeom>
+          <a:noFill/>
+        </p:spPr>
+        <p:txBody>
+          <a:bodyPr wrap="square" rtlCol="0">
+            <a:spAutoFit/>
+          </a:bodyPr>
+          <a:lstStyle/>
+          <a:p>
+            <a:r>
+              <a:rPr lang="en-US" sz="4400" b="1" dirty="0">
+                <a:solidFill>
+                  <a:schemeClr val="bg2"/>
+                </a:solidFill>
+              </a:rPr>
+              <a:t>Mondays</a:t>
+            </a:r>
+            <a:r>
+              <a:rPr lang="en-US" sz="4400" dirty="0">
+                <a:solidFill>
+                  <a:schemeClr val="bg2"/>
+                </a:solidFill>
+              </a:rPr>
+              <a:t> | 9 AM US/Pacific</a:t>
+            </a:r>
+            <a:endParaRPr lang="en-US" dirty="0">
+              <a:solidFill>
+                <a:schemeClr val="bg2"/>
+              </a:solidFill>
+            </a:endParaRPr>
+          </a:p>
+        </p:txBody>
+      </p:sp>
+    </p:spTree>
+    <p:extLst>
+      <p:ext uri="{BB962C8B-B14F-4D97-AF65-F5344CB8AC3E}">
+        <p14:creationId xmlns:p14="http://schemas.microsoft.com/office/powerpoint/2010/main" val="312378609"/>
+      </p:ext>
+    </p:extLst>
+  </p:cSld>
+  <p:clrMapOvr>
+    <a:masterClrMapping/>
+  </p:clrMapOvr>
+</p:sld>
+</file>
+
 <file path=ppt/slides/slide2.xml><?xml version="1.0" encoding="utf-8"?>
 <p:sld xmlns:a="http://schemas.openxmlformats.org/drawingml/2006/main" xmlns:r="http://schemas.openxmlformats.org/officeDocument/2006/relationships" xmlns:p="http://schemas.openxmlformats.org/presentationml/2006/main">
   <p:cSld>
@@ -4485,7 +5016,7 @@
         </p:blipFill>
         <p:spPr>
           <a:xfrm>
-            <a:off x="3137831" y="728210"/>
+            <a:off x="3137831" y="214502"/>
             <a:ext cx="9054169" cy="5000064"/>
           </a:xfrm>
           <a:prstGeom prst="rect">
@@ -4493,6 +5024,59 @@
           </a:prstGeom>
         </p:spPr>
       </p:pic>
+      <p:sp>
+        <p:nvSpPr>
+          <p:cNvPr id="5" name="TextBox 4">
+            <a:extLst>
+              <a:ext uri="{FF2B5EF4-FFF2-40B4-BE49-F238E27FC236}">
+                <a16:creationId xmlns:a16="http://schemas.microsoft.com/office/drawing/2014/main" id="{A82D00D6-4E45-4A28-BF1E-0350DE08B1E4}"/>
+              </a:ext>
+            </a:extLst>
+          </p:cNvPr>
+          <p:cNvSpPr txBox="1"/>
+          <p:nvPr/>
+        </p:nvSpPr>
+        <p:spPr>
+          <a:xfrm>
+            <a:off x="2856940" y="5266841"/>
+            <a:ext cx="9615949" cy="769441"/>
+          </a:xfrm>
+          <a:prstGeom prst="rect">
+            <a:avLst/>
+          </a:prstGeom>
+          <a:noFill/>
+        </p:spPr>
+        <p:txBody>
+          <a:bodyPr wrap="square" rtlCol="0">
+            <a:spAutoFit/>
+          </a:bodyPr>
+          <a:lstStyle/>
+          <a:p>
+            <a:pPr algn="ctr"/>
+            <a:r>
+              <a:rPr lang="en-US" sz="4400" b="1" dirty="0">
+                <a:solidFill>
+                  <a:schemeClr val="bg2"/>
+                </a:solidFill>
+              </a:rPr>
+              <a:t>Mondays</a:t>
+            </a:r>
+            <a:r>
+              <a:rPr lang="en-US" sz="4400" dirty="0">
+                <a:solidFill>
+                  <a:schemeClr val="bg2"/>
+                </a:solidFill>
+              </a:rPr>
+              <a:t> | 9 AM US/Pacific</a:t>
+            </a:r>
+            <a:endParaRPr lang="en-US" dirty="0">
+              <a:solidFill>
+                <a:schemeClr val="bg2"/>
+              </a:solidFill>
+            </a:endParaRPr>
+          </a:p>
+        </p:txBody>
+      </p:sp>
     </p:spTree>
     <p:extLst>
       <p:ext uri="{BB962C8B-B14F-4D97-AF65-F5344CB8AC3E}">
@@ -4759,8 +5343,8 @@
         </p:nvSpPr>
         <p:spPr>
           <a:xfrm>
-            <a:off x="412954" y="2926080"/>
-            <a:ext cx="6359505" cy="2215991"/>
+            <a:off x="319715" y="2955296"/>
+            <a:ext cx="6771014" cy="2369880"/>
           </a:xfrm>
           <a:prstGeom prst="rect">
             <a:avLst/>
@@ -4796,31 +5380,20 @@
               </a:rPr>
             </a:br>
             <a:r>
-              <a:rPr lang="en-US" sz="4400" b="1" dirty="0">
+              <a:rPr lang="en-US" sz="4000" b="1" i="0" dirty="0">
                 <a:solidFill>
-                  <a:schemeClr val="bg2"/>
+                  <a:srgbClr val="F8F9FA"/>
                 </a:solidFill>
+                <a:effectLst/>
+                <a:latin typeface="SFMono-Regular"/>
               </a:rPr>
-              <a:t>Hacking </a:t>
-            </a:r>
-            <a:r>
-              <a:rPr lang="en-US" sz="4400" b="1" dirty="0" err="1">
-                <a:solidFill>
-                  <a:schemeClr val="bg2"/>
-                </a:solidFill>
-              </a:rPr>
-              <a:t>DateTime</a:t>
-            </a:r>
-            <a:r>
-              <a:rPr lang="en-US" sz="4400" b="1" dirty="0">
-                <a:solidFill>
-                  <a:schemeClr val="bg2"/>
-                </a:solidFill>
-              </a:rPr>
-              <a:t> bugs in PROD </a:t>
-            </a:r>
-            <a:r>
-              <a:rPr lang="en-US" sz="4400" dirty="0">
+              <a:t>Serverless Machine Learning</a:t>
+            </a:r>
+          </a:p>
+          <a:p>
+            <a:pPr algn="l"/>
+            <a:r>
+              <a:rPr lang="en-US" sz="4000" dirty="0">
                 <a:solidFill>
                   <a:schemeClr val="bg2"/>
                 </a:solidFill>
@@ -4828,13 +5401,30 @@
               <a:t>with</a:t>
             </a:r>
             <a:r>
-              <a:rPr lang="en-US" sz="4400" b="1" dirty="0">
+              <a:rPr lang="en-US" sz="4000" b="1" dirty="0">
                 <a:solidFill>
                   <a:schemeClr val="bg2"/>
                 </a:solidFill>
               </a:rPr>
-              <a:t> Jon Skeet</a:t>
-            </a:r>
+              <a:t> </a:t>
+            </a:r>
+            <a:r>
+              <a:rPr lang="en-US" sz="4000" b="1" i="0" dirty="0">
+                <a:solidFill>
+                  <a:srgbClr val="D9D9D9"/>
+                </a:solidFill>
+                <a:effectLst/>
+                <a:latin typeface="TwitterChirp"/>
+              </a:rPr>
+              <a:t>Luis Beltran</a:t>
+            </a:r>
+            <a:br>
+              <a:rPr lang="en-US" sz="4000" b="1" dirty="0">
+                <a:solidFill>
+                  <a:schemeClr val="bg2"/>
+                </a:solidFill>
+              </a:rPr>
+            </a:br>
             <a:endParaRPr lang="en-US" b="1" dirty="0">
               <a:solidFill>
                 <a:schemeClr val="bg2"/>
@@ -4922,7 +5512,7 @@
         </p:blipFill>
         <p:spPr bwMode="auto">
           <a:xfrm>
-            <a:off x="6928217" y="3429000"/>
+            <a:off x="6797243" y="3246987"/>
             <a:ext cx="1786497" cy="1786497"/>
           </a:xfrm>
           <a:prstGeom prst="ellipse">

</xml_diff>